<commit_message>
null ist ein Objekt - ganz offiziell
</commit_message>
<xml_diff>
--- a/coding-sessions/code_talks.pptx
+++ b/coding-sessions/code_talks.pptx
@@ -10750,9 +10750,8 @@
             </a:pPr>
             <a:r>
               <a:rPr lang="de-DE" dirty="0" smtClean="0"/>
-              <a:t>null </a:t>
-            </a:r>
-            <a:endParaRPr lang="de-DE" dirty="0"/>
+              <a:t>undefined </a:t>
+            </a:r>
           </a:p>
           <a:p>
             <a:pPr>
@@ -10760,9 +10759,26 @@
               <a:buChar char="•"/>
             </a:pPr>
             <a:r>
-              <a:rPr lang="de-DE" dirty="0" smtClean="0"/>
-              <a:t>undefined </a:t>
-            </a:r>
+              <a:rPr lang="de-DE" dirty="0"/>
+              <a:t>null ist </a:t>
+            </a:r>
+            <a:r>
+              <a:rPr lang="de-DE" dirty="0" smtClean="0"/>
+              <a:t>kein </a:t>
+            </a:r>
+            <a:r>
+              <a:rPr lang="de-DE" dirty="0" err="1" smtClean="0"/>
+              <a:t>Basistyp</a:t>
+            </a:r>
+            <a:r>
+              <a:rPr lang="de-DE" smtClean="0"/>
+              <a:t> sondern ein </a:t>
+            </a:r>
+            <a:r>
+              <a:rPr lang="de-DE" dirty="0" smtClean="0"/>
+              <a:t>Objekt</a:t>
+            </a:r>
+            <a:endParaRPr lang="de-DE" dirty="0" smtClean="0"/>
           </a:p>
           <a:p>
             <a:pPr marL="0" indent="0">

</xml_diff>